<commit_message>
minor edit on slide 2
</commit_message>
<xml_diff>
--- a/user-engagement/impact-task-and-finish-group--project-summary.pptx
+++ b/user-engagement/impact-task-and-finish-group--project-summary.pptx
@@ -514,6 +514,107 @@
           <a:bodyPr/>
           <a:lstStyle/>
           <a:p>
+            <a:pPr marL="171450" indent="-171450">
+              <a:buFontTx/>
+              <a:buChar char="-"/>
+            </a:pPr>
+            <a:r>
+              <a:rPr lang="en-GB" dirty="0"/>
+              <a:t>Data Science Accelerator project</a:t>
+            </a:r>
+          </a:p>
+          <a:p>
+            <a:pPr marL="171450" indent="-171450">
+              <a:buFontTx/>
+              <a:buChar char="-"/>
+            </a:pPr>
+            <a:r>
+              <a:rPr lang="en-GB" dirty="0"/>
+              <a:t>Currently developing a prototype -&gt; not ready for production for a while yet</a:t>
+            </a:r>
+          </a:p>
+        </p:txBody>
+      </p:sp>
+      <p:sp>
+        <p:nvSpPr>
+          <p:cNvPr id="4" name="Slide Number Placeholder 3"/>
+          <p:cNvSpPr>
+            <a:spLocks noGrp="1"/>
+          </p:cNvSpPr>
+          <p:nvPr>
+            <p:ph type="sldNum" sz="quarter" idx="5"/>
+          </p:nvPr>
+        </p:nvSpPr>
+        <p:spPr/>
+        <p:txBody>
+          <a:bodyPr/>
+          <a:lstStyle/>
+          <a:p>
+            <a:fld id="{D5D14365-82F2-49CE-97EF-045AA251D32F}" type="slidenum">
+              <a:rPr lang="en-GB" smtClean="0"/>
+              <a:t>2</a:t>
+            </a:fld>
+            <a:endParaRPr lang="en-GB"/>
+          </a:p>
+        </p:txBody>
+      </p:sp>
+    </p:spTree>
+    <p:extLst>
+      <p:ext uri="{BB962C8B-B14F-4D97-AF65-F5344CB8AC3E}">
+        <p14:creationId xmlns:p14="http://schemas.microsoft.com/office/powerpoint/2010/main" val="1117588087"/>
+      </p:ext>
+    </p:extLst>
+  </p:cSld>
+  <p:clrMapOvr>
+    <a:masterClrMapping/>
+  </p:clrMapOvr>
+</p:notes>
+</file>
+
+<file path=ppt/notesSlides/notesSlide2.xml><?xml version="1.0" encoding="utf-8"?>
+<p:notes xmlns:a="http://schemas.openxmlformats.org/drawingml/2006/main" xmlns:r="http://schemas.openxmlformats.org/officeDocument/2006/relationships" xmlns:p="http://schemas.openxmlformats.org/presentationml/2006/main">
+  <p:cSld>
+    <p:spTree>
+      <p:nvGrpSpPr>
+        <p:cNvPr id="1" name=""/>
+        <p:cNvGrpSpPr/>
+        <p:nvPr/>
+      </p:nvGrpSpPr>
+      <p:grpSpPr>
+        <a:xfrm>
+          <a:off x="0" y="0"/>
+          <a:ext cx="0" cy="0"/>
+          <a:chOff x="0" y="0"/>
+          <a:chExt cx="0" cy="0"/>
+        </a:xfrm>
+      </p:grpSpPr>
+      <p:sp>
+        <p:nvSpPr>
+          <p:cNvPr id="2" name="Slide Image Placeholder 1"/>
+          <p:cNvSpPr>
+            <a:spLocks noGrp="1" noRot="1" noChangeAspect="1"/>
+          </p:cNvSpPr>
+          <p:nvPr>
+            <p:ph type="sldImg"/>
+          </p:nvPr>
+        </p:nvSpPr>
+        <p:spPr/>
+      </p:sp>
+      <p:sp>
+        <p:nvSpPr>
+          <p:cNvPr id="3" name="Notes Placeholder 2"/>
+          <p:cNvSpPr>
+            <a:spLocks noGrp="1"/>
+          </p:cNvSpPr>
+          <p:nvPr>
+            <p:ph type="body" idx="1"/>
+          </p:nvPr>
+        </p:nvSpPr>
+        <p:spPr/>
+        <p:txBody>
+          <a:bodyPr/>
+          <a:lstStyle/>
+          <a:p>
             <a:r>
               <a:rPr lang="en-GB" dirty="0"/>
               <a:t>Sentiment</a:t>
@@ -557,7 +658,7 @@
 </p:notes>
 </file>
 
-<file path=ppt/notesSlides/notesSlide2.xml><?xml version="1.0" encoding="utf-8"?>
+<file path=ppt/notesSlides/notesSlide3.xml><?xml version="1.0" encoding="utf-8"?>
 <p:notes xmlns:a="http://schemas.openxmlformats.org/drawingml/2006/main" xmlns:r="http://schemas.openxmlformats.org/officeDocument/2006/relationships" xmlns:p="http://schemas.openxmlformats.org/presentationml/2006/main">
   <p:cSld>
     <p:spTree>
@@ -4901,7 +5002,7 @@
           <a:p>
             <a:r>
               <a:rPr lang="en-GB" dirty="0"/>
-              <a:t>Use data science techniques (NLP) to extract information from Hansard, the written record of the UK Parliament</a:t>
+              <a:t>Use data science techniques (NLP) to extract information from Hansard</a:t>
             </a:r>
           </a:p>
           <a:p>

</xml_diff>

<commit_message>
minor update to .pptx for T&F group presentation. update to topic classification - remove stopwords/lemmatize debate titles for debate title model
</commit_message>
<xml_diff>
--- a/user-engagement/impact-task-and-finish-group--project-summary.pptx
+++ b/user-engagement/impact-task-and-finish-group--project-summary.pptx
@@ -202,7 +202,7 @@
           <a:p>
             <a:fld id="{A1A1BABF-AB96-4C5A-8905-83FF4DDFA0DC}" type="datetimeFigureOut">
               <a:rPr lang="en-GB" smtClean="0"/>
-              <a:t>13/05/2021</a:t>
+              <a:t>14/05/2021</a:t>
             </a:fld>
             <a:endParaRPr lang="en-GB"/>
           </a:p>
@@ -894,7 +894,7 @@
           <a:p>
             <a:fld id="{E4A62EDC-D5D1-49C5-B313-6E6F916DA0E0}" type="datetimeFigureOut">
               <a:rPr lang="en-GB" smtClean="0"/>
-              <a:t>13/05/2021</a:t>
+              <a:t>14/05/2021</a:t>
             </a:fld>
             <a:endParaRPr lang="en-GB"/>
           </a:p>
@@ -1094,7 +1094,7 @@
           <a:p>
             <a:fld id="{E4A62EDC-D5D1-49C5-B313-6E6F916DA0E0}" type="datetimeFigureOut">
               <a:rPr lang="en-GB" smtClean="0"/>
-              <a:t>13/05/2021</a:t>
+              <a:t>14/05/2021</a:t>
             </a:fld>
             <a:endParaRPr lang="en-GB"/>
           </a:p>
@@ -1304,7 +1304,7 @@
           <a:p>
             <a:fld id="{E4A62EDC-D5D1-49C5-B313-6E6F916DA0E0}" type="datetimeFigureOut">
               <a:rPr lang="en-GB" smtClean="0"/>
-              <a:t>13/05/2021</a:t>
+              <a:t>14/05/2021</a:t>
             </a:fld>
             <a:endParaRPr lang="en-GB"/>
           </a:p>
@@ -2210,7 +2210,7 @@
           <a:p>
             <a:fld id="{E4A62EDC-D5D1-49C5-B313-6E6F916DA0E0}" type="datetimeFigureOut">
               <a:rPr lang="en-GB" smtClean="0"/>
-              <a:t>13/05/2021</a:t>
+              <a:t>14/05/2021</a:t>
             </a:fld>
             <a:endParaRPr lang="en-GB"/>
           </a:p>
@@ -2486,7 +2486,7 @@
           <a:p>
             <a:fld id="{E4A62EDC-D5D1-49C5-B313-6E6F916DA0E0}" type="datetimeFigureOut">
               <a:rPr lang="en-GB" smtClean="0"/>
-              <a:t>13/05/2021</a:t>
+              <a:t>14/05/2021</a:t>
             </a:fld>
             <a:endParaRPr lang="en-GB"/>
           </a:p>
@@ -2754,7 +2754,7 @@
           <a:p>
             <a:fld id="{E4A62EDC-D5D1-49C5-B313-6E6F916DA0E0}" type="datetimeFigureOut">
               <a:rPr lang="en-GB" smtClean="0"/>
-              <a:t>13/05/2021</a:t>
+              <a:t>14/05/2021</a:t>
             </a:fld>
             <a:endParaRPr lang="en-GB"/>
           </a:p>
@@ -3169,7 +3169,7 @@
           <a:p>
             <a:fld id="{E4A62EDC-D5D1-49C5-B313-6E6F916DA0E0}" type="datetimeFigureOut">
               <a:rPr lang="en-GB" smtClean="0"/>
-              <a:t>13/05/2021</a:t>
+              <a:t>14/05/2021</a:t>
             </a:fld>
             <a:endParaRPr lang="en-GB"/>
           </a:p>
@@ -3311,7 +3311,7 @@
           <a:p>
             <a:fld id="{E4A62EDC-D5D1-49C5-B313-6E6F916DA0E0}" type="datetimeFigureOut">
               <a:rPr lang="en-GB" smtClean="0"/>
-              <a:t>13/05/2021</a:t>
+              <a:t>14/05/2021</a:t>
             </a:fld>
             <a:endParaRPr lang="en-GB"/>
           </a:p>
@@ -3424,7 +3424,7 @@
           <a:p>
             <a:fld id="{E4A62EDC-D5D1-49C5-B313-6E6F916DA0E0}" type="datetimeFigureOut">
               <a:rPr lang="en-GB" smtClean="0"/>
-              <a:t>13/05/2021</a:t>
+              <a:t>14/05/2021</a:t>
             </a:fld>
             <a:endParaRPr lang="en-GB"/>
           </a:p>
@@ -3737,7 +3737,7 @@
           <a:p>
             <a:fld id="{E4A62EDC-D5D1-49C5-B313-6E6F916DA0E0}" type="datetimeFigureOut">
               <a:rPr lang="en-GB" smtClean="0"/>
-              <a:t>13/05/2021</a:t>
+              <a:t>14/05/2021</a:t>
             </a:fld>
             <a:endParaRPr lang="en-GB"/>
           </a:p>
@@ -4026,7 +4026,7 @@
           <a:p>
             <a:fld id="{E4A62EDC-D5D1-49C5-B313-6E6F916DA0E0}" type="datetimeFigureOut">
               <a:rPr lang="en-GB" smtClean="0"/>
-              <a:t>13/05/2021</a:t>
+              <a:t>14/05/2021</a:t>
             </a:fld>
             <a:endParaRPr lang="en-GB"/>
           </a:p>
@@ -4269,7 +4269,7 @@
           <a:p>
             <a:fld id="{E4A62EDC-D5D1-49C5-B313-6E6F916DA0E0}" type="datetimeFigureOut">
               <a:rPr lang="en-GB" smtClean="0"/>
-              <a:t>13/05/2021</a:t>
+              <a:t>14/05/2021</a:t>
             </a:fld>
             <a:endParaRPr lang="en-GB"/>
           </a:p>
@@ -10346,8 +10346,8 @@
         </p:nvSpPr>
         <p:spPr>
           <a:xfrm>
-            <a:off x="838200" y="1424324"/>
-            <a:ext cx="10515600" cy="5022529"/>
+            <a:off x="838200" y="1336092"/>
+            <a:ext cx="10515600" cy="5354927"/>
           </a:xfrm>
         </p:spPr>
         <p:txBody>
@@ -10403,7 +10403,7 @@
                   <a:schemeClr val="tx1"/>
                 </a:solidFill>
               </a:rPr>
-              <a:t>ML using </a:t>
+              <a:t>ML/rules-based approach using </a:t>
             </a:r>
             <a:r>
               <a:rPr lang="en-GB" sz="2400" dirty="0" err="1">

</xml_diff>